<commit_message>
Update section 2 slides
</commit_message>
<xml_diff>
--- a/s2/slides/s2.pptx
+++ b/s2/slides/s2.pptx
@@ -214,7 +214,7 @@
           <a:p>
             <a:fld id="{EBD6F028-2067-3740-AA48-A91E93570B1D}" type="datetimeFigureOut">
               <a:rPr lang="en-US" smtClean="0"/>
-              <a:t>9/27/20</a:t>
+              <a:t>10/4/2021</a:t>
             </a:fld>
             <a:endParaRPr lang="en-US"/>
           </a:p>
@@ -1562,7 +1562,7 @@
           <a:p>
             <a:r>
               <a:rPr lang="en-US" dirty="0"/>
-              <a:t>Learn how group login accounts will work for the rest of the class.</a:t>
+              <a:t>Learn how group login accounts will work for the rest of the class, including your final project.</a:t>
             </a:r>
           </a:p>
           <a:p>
@@ -1835,7 +1835,7 @@
           <a:p>
             <a:r>
               <a:rPr lang="en-US" dirty="0"/>
-              <a:t>Last year, some students had laptops which weren’t powerful enough to run a VM + robot simulation software which was necessary for homework and very helpful for the final project.</a:t>
+              <a:t>In previous years, some students had laptops which weren’t powerful enough to run a VM + robot simulation software which was necessary for homework and very helpful for the final project.</a:t>
             </a:r>
           </a:p>
           <a:p>
@@ -1862,13 +1862,8 @@
           <a:p>
             <a:r>
               <a:rPr lang="en-US" dirty="0"/>
-              <a:t>Each breakout room will be assigned an account to use and work together to complete </a:t>
-            </a:r>
-            <a:r>
-              <a:rPr lang="en-US"/>
-              <a:t>the assignment</a:t>
-            </a:r>
-            <a:endParaRPr lang="en-US" dirty="0"/>
+              <a:t>Each group or breakout room will be assigned an account to use and work together to complete the assignment</a:t>
+            </a:r>
           </a:p>
         </p:txBody>
       </p:sp>

</xml_diff>